<commit_message>
added link to youtube
</commit_message>
<xml_diff>
--- a/01_doc/DigitalCameraDesignDocument.pptx
+++ b/01_doc/DigitalCameraDesignDocument.pptx
@@ -47997,9 +47997,12 @@
               <a:buChar char="Ø"/>
             </a:pPr>
             <a:r>
-              <a:rPr lang="en-US" altLang="ja-JP" sz="2400" dirty="0"/>
-              <a:t>T.B.D links to YouTube</a:t>
-            </a:r>
+              <a:rPr lang="en-US" altLang="ja-JP" sz="2400" dirty="0">
+                <a:hlinkClick r:id="rId6"/>
+              </a:rPr>
+              <a:t>https://www.youtube.com/watch?v=CgX3bM4v_aU</a:t>
+            </a:r>
+            <a:endParaRPr lang="en-US" altLang="ja-JP" sz="2400" dirty="0"/>
           </a:p>
         </p:txBody>
       </p:sp>

</xml_diff>